<commit_message>
note algoritmi + fisiere intrebari examen
</commit_message>
<xml_diff>
--- a/AlgoritmiSiStructuriDeDate1/Cursuri/cursul 5.pptx
+++ b/AlgoritmiSiStructuriDeDate1/Cursuri/cursul 5.pptx
@@ -331,7 +331,7 @@
           <a:p>
             <a:fld id="{C7856C7F-C199-47A3-AF94-EAE81E21E31B}" type="datetimeFigureOut">
               <a:rPr lang="en-US" smtClean="0"/>
-              <a:t>11/1/2025</a:t>
+              <a:t>1/10/2026</a:t>
             </a:fld>
             <a:endParaRPr lang="en-US"/>
           </a:p>
@@ -499,7 +499,7 @@
           <a:p>
             <a:fld id="{C7856C7F-C199-47A3-AF94-EAE81E21E31B}" type="datetimeFigureOut">
               <a:rPr lang="en-US" smtClean="0"/>
-              <a:t>11/1/2025</a:t>
+              <a:t>1/10/2026</a:t>
             </a:fld>
             <a:endParaRPr lang="en-US"/>
           </a:p>
@@ -677,7 +677,7 @@
           <a:p>
             <a:fld id="{C7856C7F-C199-47A3-AF94-EAE81E21E31B}" type="datetimeFigureOut">
               <a:rPr lang="en-US" smtClean="0"/>
-              <a:t>11/1/2025</a:t>
+              <a:t>1/10/2026</a:t>
             </a:fld>
             <a:endParaRPr lang="en-US"/>
           </a:p>
@@ -846,7 +846,7 @@
           <a:p>
             <a:fld id="{C7856C7F-C199-47A3-AF94-EAE81E21E31B}" type="datetimeFigureOut">
               <a:rPr lang="en-US" smtClean="0"/>
-              <a:t>11/1/2025</a:t>
+              <a:t>1/10/2026</a:t>
             </a:fld>
             <a:endParaRPr lang="en-US"/>
           </a:p>
@@ -1089,7 +1089,7 @@
           <a:p>
             <a:fld id="{C7856C7F-C199-47A3-AF94-EAE81E21E31B}" type="datetimeFigureOut">
               <a:rPr lang="en-US" smtClean="0"/>
-              <a:t>11/1/2025</a:t>
+              <a:t>1/10/2026</a:t>
             </a:fld>
             <a:endParaRPr lang="en-US"/>
           </a:p>
@@ -1184,7 +1184,7 @@
           <a:p>
             <a:fld id="{C7856C7F-C199-47A3-AF94-EAE81E21E31B}" type="datetimeFigureOut">
               <a:rPr lang="en-US" smtClean="0"/>
-              <a:t>11/1/2025</a:t>
+              <a:t>1/10/2026</a:t>
             </a:fld>
             <a:endParaRPr lang="en-US"/>
           </a:p>
@@ -1560,7 +1560,7 @@
           <a:p>
             <a:fld id="{C7856C7F-C199-47A3-AF94-EAE81E21E31B}" type="datetimeFigureOut">
               <a:rPr lang="en-US" smtClean="0"/>
-              <a:t>11/1/2025</a:t>
+              <a:t>1/10/2026</a:t>
             </a:fld>
             <a:endParaRPr lang="en-US"/>
           </a:p>
@@ -1819,7 +1819,7 @@
           <a:p>
             <a:fld id="{C7856C7F-C199-47A3-AF94-EAE81E21E31B}" type="datetimeFigureOut">
               <a:rPr lang="en-US" smtClean="0"/>
-              <a:t>11/1/2025</a:t>
+              <a:t>1/10/2026</a:t>
             </a:fld>
             <a:endParaRPr lang="en-US"/>
           </a:p>
@@ -1914,7 +1914,7 @@
           <a:p>
             <a:fld id="{C7856C7F-C199-47A3-AF94-EAE81E21E31B}" type="datetimeFigureOut">
               <a:rPr lang="en-US" smtClean="0"/>
-              <a:t>11/1/2025</a:t>
+              <a:t>1/10/2026</a:t>
             </a:fld>
             <a:endParaRPr lang="en-US"/>
           </a:p>
@@ -2193,7 +2193,7 @@
           <a:p>
             <a:fld id="{C7856C7F-C199-47A3-AF94-EAE81E21E31B}" type="datetimeFigureOut">
               <a:rPr lang="en-US" smtClean="0"/>
-              <a:t>11/1/2025</a:t>
+              <a:t>1/10/2026</a:t>
             </a:fld>
             <a:endParaRPr lang="en-US"/>
           </a:p>
@@ -2470,7 +2470,7 @@
           <a:p>
             <a:fld id="{C7856C7F-C199-47A3-AF94-EAE81E21E31B}" type="datetimeFigureOut">
               <a:rPr lang="en-US" smtClean="0"/>
-              <a:t>11/1/2025</a:t>
+              <a:t>1/10/2026</a:t>
             </a:fld>
             <a:endParaRPr lang="en-US"/>
           </a:p>
@@ -2775,7 +2775,7 @@
           <a:p>
             <a:fld id="{C7856C7F-C199-47A3-AF94-EAE81E21E31B}" type="datetimeFigureOut">
               <a:rPr lang="en-US" smtClean="0"/>
-              <a:t>11/1/2025</a:t>
+              <a:t>1/10/2026</a:t>
             </a:fld>
             <a:endParaRPr lang="en-US"/>
           </a:p>
@@ -6115,7 +6115,7 @@
               <a:buNone/>
             </a:pPr>
             <a:r>
-              <a:rPr lang="ro-RO" sz="2800" b="1" noProof="0" dirty="0">
+              <a:rPr lang="ro-RO" sz="2400" b="1" noProof="0" dirty="0">
                 <a:solidFill>
                   <a:srgbClr val="CCCCCC"/>
                 </a:solidFill>
@@ -6124,7 +6124,7 @@
               <a:t>            </a:t>
             </a:r>
             <a:r>
-              <a:rPr lang="ro-RO" sz="2800" b="1" noProof="0" dirty="0" err="1">
+              <a:rPr lang="ro-RO" sz="2400" b="1" noProof="0" dirty="0" err="1">
                 <a:solidFill>
                   <a:srgbClr val="CCCCCC"/>
                 </a:solidFill>
@@ -6133,7 +6133,7 @@
               <a:t>Console.</a:t>
             </a:r>
             <a:r>
-              <a:rPr lang="ro-RO" sz="2800" b="1" noProof="0" dirty="0" err="1">
+              <a:rPr lang="ro-RO" sz="2400" b="1" noProof="0" dirty="0" err="1">
                 <a:solidFill>
                   <a:srgbClr val="F08D49"/>
                 </a:solidFill>
@@ -6142,7 +6142,7 @@
               <a:t>WriteLine</a:t>
             </a:r>
             <a:r>
-              <a:rPr lang="ro-RO" sz="2800" b="1" noProof="0" dirty="0">
+              <a:rPr lang="ro-RO" sz="2400" b="1" noProof="0" dirty="0">
                 <a:solidFill>
                   <a:srgbClr val="CCCCCC"/>
                 </a:solidFill>
@@ -6151,7 +6151,7 @@
               <a:t>(</a:t>
             </a:r>
             <a:r>
-              <a:rPr lang="ro-RO" sz="2800" b="1" noProof="0" dirty="0">
+              <a:rPr lang="ro-RO" sz="2400" b="1" noProof="0" dirty="0">
                 <a:solidFill>
                   <a:srgbClr val="7EC699"/>
                 </a:solidFill>
@@ -6165,7 +6165,7 @@
               <a:buNone/>
             </a:pPr>
             <a:r>
-              <a:rPr lang="ro-RO" sz="2800" b="1" noProof="0" dirty="0">
+              <a:rPr lang="ro-RO" sz="2400" b="1" noProof="0" dirty="0">
                 <a:solidFill>
                   <a:srgbClr val="7EC699"/>
                 </a:solidFill>
@@ -6174,7 +6174,7 @@
               <a:t>            </a:t>
             </a:r>
             <a:r>
-              <a:rPr lang="ro-RO" sz="2800" b="1" noProof="0" dirty="0" err="1">
+              <a:rPr lang="ro-RO" sz="2400" b="1" noProof="0" dirty="0" err="1">
                 <a:solidFill>
                   <a:srgbClr val="7EC699"/>
                 </a:solidFill>
@@ -6183,7 +6183,7 @@
               <a:t>weather</a:t>
             </a:r>
             <a:r>
-              <a:rPr lang="ro-RO" sz="2800" b="1" noProof="0" dirty="0">
+              <a:rPr lang="ro-RO" sz="2400" b="1" noProof="0" dirty="0">
                 <a:solidFill>
                   <a:srgbClr val="7EC699"/>
                 </a:solidFill>
@@ -6192,7 +6192,7 @@
               <a:t> </a:t>
             </a:r>
             <a:r>
-              <a:rPr lang="ro-RO" sz="2800" b="1" noProof="0" dirty="0" err="1">
+              <a:rPr lang="ro-RO" sz="2400" b="1" noProof="0" dirty="0" err="1">
                 <a:solidFill>
                   <a:srgbClr val="7EC699"/>
                 </a:solidFill>
@@ -6201,7 +6201,7 @@
               <a:t>is</a:t>
             </a:r>
             <a:r>
-              <a:rPr lang="ro-RO" sz="2800" b="1" noProof="0" dirty="0">
+              <a:rPr lang="ro-RO" sz="2400" b="1" noProof="0" dirty="0">
                 <a:solidFill>
                   <a:srgbClr val="7EC699"/>
                 </a:solidFill>
@@ -6210,7 +6210,7 @@
               <a:t> </a:t>
             </a:r>
             <a:r>
-              <a:rPr lang="ro-RO" sz="2800" b="1" noProof="0" dirty="0" err="1">
+              <a:rPr lang="ro-RO" sz="2400" b="1" noProof="0" dirty="0" err="1">
                 <a:solidFill>
                   <a:srgbClr val="7EC699"/>
                 </a:solidFill>
@@ -6219,7 +6219,7 @@
               <a:t>pleasant</a:t>
             </a:r>
             <a:r>
-              <a:rPr lang="ro-RO" sz="2800" b="1" noProof="0" dirty="0">
+              <a:rPr lang="ro-RO" sz="2400" b="1" noProof="0" dirty="0">
                 <a:solidFill>
                   <a:srgbClr val="7EC699"/>
                 </a:solidFill>
@@ -6228,7 +6228,7 @@
               <a:t>."</a:t>
             </a:r>
             <a:r>
-              <a:rPr lang="ro-RO" sz="2800" b="1" noProof="0" dirty="0">
+              <a:rPr lang="ro-RO" sz="2400" b="1" noProof="0" dirty="0">
                 <a:solidFill>
                   <a:srgbClr val="CCCCCC"/>
                 </a:solidFill>
@@ -6242,7 +6242,7 @@
               <a:buNone/>
             </a:pPr>
             <a:r>
-              <a:rPr lang="ro-RO" sz="2800" b="1" noProof="0" dirty="0">
+              <a:rPr lang="ro-RO" sz="2400" b="1" noProof="0" dirty="0">
                 <a:solidFill>
                   <a:srgbClr val="CCCCCC"/>
                 </a:solidFill>
@@ -6251,7 +6251,7 @@
               <a:t>          } </a:t>
             </a:r>
             <a:r>
-              <a:rPr lang="ro-RO" sz="2800" b="1" noProof="0" dirty="0" err="1">
+              <a:rPr lang="ro-RO" sz="2400" b="1" noProof="0" dirty="0" err="1">
                 <a:solidFill>
                   <a:srgbClr val="CC99CD"/>
                 </a:solidFill>
@@ -6260,7 +6260,7 @@
               <a:t>else</a:t>
             </a:r>
             <a:r>
-              <a:rPr lang="ro-RO" sz="2800" b="1" noProof="0" dirty="0">
+              <a:rPr lang="ro-RO" sz="2400" b="1" noProof="0" dirty="0">
                 <a:solidFill>
                   <a:srgbClr val="CCCCCC"/>
                 </a:solidFill>
@@ -6274,7 +6274,7 @@
               <a:buNone/>
             </a:pPr>
             <a:r>
-              <a:rPr lang="ro-RO" sz="2800" b="1" noProof="0" dirty="0">
+              <a:rPr lang="ro-RO" sz="2400" b="1" noProof="0" dirty="0">
                 <a:solidFill>
                   <a:srgbClr val="CCCCCC"/>
                 </a:solidFill>
@@ -6283,7 +6283,7 @@
               <a:t>            </a:t>
             </a:r>
             <a:r>
-              <a:rPr lang="ro-RO" sz="2800" b="1" noProof="0" dirty="0" err="1">
+              <a:rPr lang="ro-RO" sz="2400" b="1" noProof="0" dirty="0" err="1">
                 <a:solidFill>
                   <a:srgbClr val="CCCCCC"/>
                 </a:solidFill>
@@ -6292,7 +6292,7 @@
               <a:t>Console.</a:t>
             </a:r>
             <a:r>
-              <a:rPr lang="ro-RO" sz="2800" b="1" noProof="0" dirty="0" err="1">
+              <a:rPr lang="ro-RO" sz="2400" b="1" noProof="0" dirty="0" err="1">
                 <a:solidFill>
                   <a:srgbClr val="F08D49"/>
                 </a:solidFill>
@@ -6301,7 +6301,7 @@
               <a:t>WriteLine</a:t>
             </a:r>
             <a:r>
-              <a:rPr lang="ro-RO" sz="2800" b="1" noProof="0" dirty="0">
+              <a:rPr lang="ro-RO" sz="2400" b="1" noProof="0" dirty="0">
                 <a:solidFill>
                   <a:srgbClr val="CCCCCC"/>
                 </a:solidFill>
@@ -6310,7 +6310,7 @@
               <a:t>(</a:t>
             </a:r>
             <a:r>
-              <a:rPr lang="ro-RO" sz="2800" b="1" noProof="0" dirty="0">
+              <a:rPr lang="ro-RO" sz="2400" b="1" noProof="0" dirty="0">
                 <a:solidFill>
                   <a:srgbClr val="7EC699"/>
                 </a:solidFill>
@@ -6319,7 +6319,7 @@
               <a:t>"</a:t>
             </a:r>
             <a:r>
-              <a:rPr lang="ro-RO" sz="2800" b="1" noProof="0" dirty="0" err="1">
+              <a:rPr lang="ro-RO" sz="2400" b="1" noProof="0" dirty="0" err="1">
                 <a:solidFill>
                   <a:srgbClr val="7EC699"/>
                 </a:solidFill>
@@ -6327,7 +6327,7 @@
               </a:rPr>
               <a:t>It’s</a:t>
             </a:r>
-            <a:endParaRPr lang="ro-RO" sz="2800" b="1" noProof="0" dirty="0">
+            <a:endParaRPr lang="ro-RO" sz="2400" b="1" noProof="0" dirty="0">
               <a:solidFill>
                 <a:srgbClr val="7EC699"/>
               </a:solidFill>
@@ -6339,7 +6339,7 @@
               <a:buNone/>
             </a:pPr>
             <a:r>
-              <a:rPr lang="ro-RO" sz="2800" b="1" noProof="0" dirty="0">
+              <a:rPr lang="ro-RO" sz="2400" b="1" noProof="0" dirty="0">
                 <a:solidFill>
                   <a:srgbClr val="7EC699"/>
                 </a:solidFill>
@@ -6348,7 +6348,7 @@
               <a:t>            a hot </a:t>
             </a:r>
             <a:r>
-              <a:rPr lang="ro-RO" sz="2800" b="1" noProof="0" dirty="0" err="1">
+              <a:rPr lang="ro-RO" sz="2400" b="1" noProof="0" dirty="0" err="1">
                 <a:solidFill>
                   <a:srgbClr val="7EC699"/>
                 </a:solidFill>
@@ -6357,7 +6357,7 @@
               <a:t>day</a:t>
             </a:r>
             <a:r>
-              <a:rPr lang="ro-RO" sz="2800" b="1" noProof="0" dirty="0">
+              <a:rPr lang="ro-RO" sz="2400" b="1" noProof="0" dirty="0">
                 <a:solidFill>
                   <a:srgbClr val="7EC699"/>
                 </a:solidFill>
@@ -6366,7 +6366,7 @@
               <a:t>."</a:t>
             </a:r>
             <a:r>
-              <a:rPr lang="ro-RO" sz="2800" b="1" noProof="0" dirty="0">
+              <a:rPr lang="ro-RO" sz="2400" b="1" noProof="0" dirty="0">
                 <a:solidFill>
                   <a:srgbClr val="CCCCCC"/>
                 </a:solidFill>
@@ -6380,7 +6380,7 @@
               <a:buNone/>
             </a:pPr>
             <a:r>
-              <a:rPr lang="ro-RO" sz="2800" b="1" noProof="0" dirty="0">
+              <a:rPr lang="ro-RO" sz="2400" b="1" noProof="0" dirty="0">
                 <a:solidFill>
                   <a:srgbClr val="CCCCCC"/>
                 </a:solidFill>
@@ -6394,7 +6394,7 @@
               <a:buNone/>
             </a:pPr>
             <a:r>
-              <a:rPr lang="ro-RO" sz="2800" b="1" noProof="0" dirty="0">
+              <a:rPr lang="ro-RO" sz="2400" b="1" noProof="0" dirty="0">
                 <a:solidFill>
                   <a:srgbClr val="CCCCCC"/>
                 </a:solidFill>
@@ -6403,7 +6403,7 @@
               <a:t>        } </a:t>
             </a:r>
             <a:r>
-              <a:rPr lang="ro-RO" sz="2800" b="1" noProof="0" dirty="0" err="1">
+              <a:rPr lang="ro-RO" sz="2400" b="1" noProof="0" dirty="0" err="1">
                 <a:solidFill>
                   <a:srgbClr val="CC99CD"/>
                 </a:solidFill>
@@ -6412,7 +6412,7 @@
               <a:t>else</a:t>
             </a:r>
             <a:r>
-              <a:rPr lang="ro-RO" sz="2800" b="1" noProof="0" dirty="0">
+              <a:rPr lang="ro-RO" sz="2400" b="1" noProof="0" dirty="0">
                 <a:solidFill>
                   <a:srgbClr val="CCCCCC"/>
                 </a:solidFill>
@@ -6426,7 +6426,7 @@
               <a:buNone/>
             </a:pPr>
             <a:r>
-              <a:rPr lang="ro-RO" sz="2800" b="1" noProof="0" dirty="0">
+              <a:rPr lang="ro-RO" sz="2400" b="1" noProof="0" dirty="0">
                 <a:solidFill>
                   <a:srgbClr val="CCCCCC"/>
                 </a:solidFill>
@@ -6435,7 +6435,7 @@
               <a:t>          </a:t>
             </a:r>
             <a:r>
-              <a:rPr lang="ro-RO" sz="2800" b="1" noProof="0" dirty="0" err="1">
+              <a:rPr lang="ro-RO" sz="2400" b="1" noProof="0" dirty="0" err="1">
                 <a:solidFill>
                   <a:srgbClr val="CCCCCC"/>
                 </a:solidFill>
@@ -6444,7 +6444,7 @@
               <a:t>Console.</a:t>
             </a:r>
             <a:r>
-              <a:rPr lang="ro-RO" sz="2800" b="1" noProof="0" dirty="0" err="1">
+              <a:rPr lang="ro-RO" sz="2400" b="1" noProof="0" dirty="0" err="1">
                 <a:solidFill>
                   <a:srgbClr val="F08D49"/>
                 </a:solidFill>
@@ -6453,7 +6453,7 @@
               <a:t>WriteLine</a:t>
             </a:r>
             <a:r>
-              <a:rPr lang="ro-RO" sz="2800" b="1" noProof="0" dirty="0">
+              <a:rPr lang="ro-RO" sz="2400" b="1" noProof="0" dirty="0">
                 <a:solidFill>
                   <a:srgbClr val="CCCCCC"/>
                 </a:solidFill>
@@ -6462,7 +6462,7 @@
               <a:t>(</a:t>
             </a:r>
             <a:r>
-              <a:rPr lang="ro-RO" sz="2800" b="1" noProof="0" dirty="0">
+              <a:rPr lang="ro-RO" sz="2400" b="1" noProof="0" dirty="0">
                 <a:solidFill>
                   <a:srgbClr val="7EC699"/>
                 </a:solidFill>
@@ -6471,7 +6471,7 @@
               <a:t>"</a:t>
             </a:r>
             <a:r>
-              <a:rPr lang="ro-RO" sz="2800" b="1" noProof="0" dirty="0" err="1">
+              <a:rPr lang="ro-RO" sz="2400" b="1" noProof="0" dirty="0" err="1">
                 <a:solidFill>
                   <a:srgbClr val="7EC699"/>
                 </a:solidFill>
@@ -6479,7 +6479,7 @@
               </a:rPr>
               <a:t>It’s</a:t>
             </a:r>
-            <a:endParaRPr lang="ro-RO" sz="2800" b="1" noProof="0" dirty="0">
+            <a:endParaRPr lang="ro-RO" sz="2400" b="1" noProof="0" dirty="0">
               <a:solidFill>
                 <a:srgbClr val="7EC699"/>
               </a:solidFill>
@@ -6491,7 +6491,7 @@
               <a:buNone/>
             </a:pPr>
             <a:r>
-              <a:rPr lang="ro-RO" sz="2800" b="1" noProof="0" dirty="0">
+              <a:rPr lang="ro-RO" sz="2400" b="1" noProof="0" dirty="0">
                 <a:solidFill>
                   <a:srgbClr val="7EC699"/>
                 </a:solidFill>
@@ -6500,7 +6500,7 @@
               <a:t>          </a:t>
             </a:r>
             <a:r>
-              <a:rPr lang="ro-RO" sz="2800" b="1" noProof="0" dirty="0" err="1">
+              <a:rPr lang="ro-RO" sz="2400" b="1" noProof="0" dirty="0" err="1">
                 <a:solidFill>
                   <a:srgbClr val="7EC699"/>
                 </a:solidFill>
@@ -6509,7 +6509,7 @@
               <a:t>freezing</a:t>
             </a:r>
             <a:r>
-              <a:rPr lang="ro-RO" sz="2800" b="1" noProof="0" dirty="0">
+              <a:rPr lang="ro-RO" sz="2400" b="1" noProof="0" dirty="0">
                 <a:solidFill>
                   <a:srgbClr val="7EC699"/>
                 </a:solidFill>
@@ -6518,7 +6518,7 @@
               <a:t> </a:t>
             </a:r>
             <a:r>
-              <a:rPr lang="ro-RO" sz="2800" b="1" noProof="0" dirty="0" err="1">
+              <a:rPr lang="ro-RO" sz="2400" b="1" noProof="0" dirty="0" err="1">
                 <a:solidFill>
                   <a:srgbClr val="7EC699"/>
                 </a:solidFill>
@@ -6527,7 +6527,7 @@
               <a:t>outside</a:t>
             </a:r>
             <a:r>
-              <a:rPr lang="ro-RO" sz="2800" b="1" noProof="0" dirty="0">
+              <a:rPr lang="ro-RO" sz="2400" b="1" noProof="0" dirty="0">
                 <a:solidFill>
                   <a:srgbClr val="7EC699"/>
                 </a:solidFill>
@@ -6536,7 +6536,7 @@
               <a:t>!"</a:t>
             </a:r>
             <a:r>
-              <a:rPr lang="ro-RO" sz="2800" b="1" noProof="0" dirty="0">
+              <a:rPr lang="ro-RO" sz="2400" b="1" noProof="0" dirty="0">
                 <a:solidFill>
                   <a:srgbClr val="CCCCCC"/>
                 </a:solidFill>
@@ -6550,7 +6550,7 @@
               <a:buNone/>
             </a:pPr>
             <a:r>
-              <a:rPr lang="ro-RO" sz="2800" b="1" noProof="0" dirty="0">
+              <a:rPr lang="ro-RO" sz="2400" b="1" noProof="0" dirty="0">
                 <a:solidFill>
                   <a:srgbClr val="CCCCCC"/>
                 </a:solidFill>
@@ -6564,7 +6564,7 @@
               <a:buNone/>
             </a:pPr>
             <a:r>
-              <a:rPr lang="ro-RO" sz="2800" b="1" noProof="0" dirty="0">
+              <a:rPr lang="ro-RO" sz="2400" b="1" noProof="0" dirty="0">
                 <a:solidFill>
                   <a:srgbClr val="CCCCCC"/>
                 </a:solidFill>
@@ -6572,7 +6572,7 @@
               </a:rPr>
               <a:t>      </a:t>
             </a:r>
-            <a:endParaRPr lang="ro-RO" sz="2800" noProof="0" dirty="0">
+            <a:endParaRPr lang="ro-RO" sz="2400" noProof="0" dirty="0">
               <a:solidFill>
                 <a:srgbClr val="00B0F0"/>
               </a:solidFill>
@@ -6683,7 +6683,7 @@
               <a:buNone/>
             </a:pPr>
             <a:r>
-              <a:rPr lang="ro-RO" sz="2800" b="1" noProof="0" dirty="0">
+              <a:rPr lang="ro-RO" sz="2400" b="1" noProof="0" dirty="0">
                 <a:solidFill>
                   <a:srgbClr val="CCCCCC"/>
                 </a:solidFill>
@@ -6692,7 +6692,7 @@
               <a:t>      </a:t>
             </a:r>
             <a:r>
-              <a:rPr lang="ro-RO" sz="2800" b="1" noProof="0" dirty="0" err="1">
+              <a:rPr lang="ro-RO" sz="2400" b="1" noProof="0" dirty="0" err="1">
                 <a:solidFill>
                   <a:srgbClr val="CCCCCC"/>
                 </a:solidFill>
@@ -6701,7 +6701,7 @@
               <a:t>Console.</a:t>
             </a:r>
             <a:r>
-              <a:rPr lang="ro-RO" sz="2800" b="1" noProof="0" dirty="0" err="1">
+              <a:rPr lang="ro-RO" sz="2400" b="1" noProof="0" dirty="0" err="1">
                 <a:solidFill>
                   <a:srgbClr val="F08D49"/>
                 </a:solidFill>
@@ -6710,7 +6710,7 @@
               <a:t>WriteLine</a:t>
             </a:r>
             <a:r>
-              <a:rPr lang="ro-RO" sz="2800" b="1" noProof="0" dirty="0">
+              <a:rPr lang="ro-RO" sz="2400" b="1" noProof="0" dirty="0">
                 <a:solidFill>
                   <a:srgbClr val="CCCCCC"/>
                 </a:solidFill>
@@ -6719,7 +6719,7 @@
               <a:t>(</a:t>
             </a:r>
             <a:r>
-              <a:rPr lang="ro-RO" sz="2800" b="1" noProof="0" dirty="0">
+              <a:rPr lang="ro-RO" sz="2400" b="1" noProof="0" dirty="0">
                 <a:solidFill>
                   <a:srgbClr val="7EC699"/>
                 </a:solidFill>
@@ -6728,7 +6728,7 @@
               <a:t>$"</a:t>
             </a:r>
             <a:r>
-              <a:rPr lang="ro-RO" sz="2800" b="1" noProof="0" dirty="0" err="1">
+              <a:rPr lang="ro-RO" sz="2400" b="1" noProof="0" dirty="0" err="1">
                 <a:solidFill>
                   <a:srgbClr val="7EC699"/>
                 </a:solidFill>
@@ -6736,7 +6736,7 @@
               </a:rPr>
               <a:t>Current</a:t>
             </a:r>
-            <a:endParaRPr lang="ro-RO" sz="2800" b="1" noProof="0" dirty="0">
+            <a:endParaRPr lang="ro-RO" sz="2400" b="1" noProof="0" dirty="0">
               <a:solidFill>
                 <a:srgbClr val="7EC699"/>
               </a:solidFill>
@@ -6748,7 +6748,7 @@
               <a:buNone/>
             </a:pPr>
             <a:r>
-              <a:rPr lang="ro-RO" sz="2800" b="1" noProof="0" dirty="0">
+              <a:rPr lang="ro-RO" sz="2400" b="1" noProof="0" dirty="0">
                 <a:solidFill>
                   <a:srgbClr val="7EC699"/>
                 </a:solidFill>
@@ -6757,7 +6757,7 @@
               <a:t>      </a:t>
             </a:r>
             <a:r>
-              <a:rPr lang="ro-RO" sz="2800" b="1" noProof="0" dirty="0" err="1">
+              <a:rPr lang="ro-RO" sz="2400" b="1" noProof="0" dirty="0" err="1">
                 <a:solidFill>
                   <a:srgbClr val="7EC699"/>
                 </a:solidFill>
@@ -6766,7 +6766,7 @@
               <a:t>temperature</a:t>
             </a:r>
             <a:r>
-              <a:rPr lang="ro-RO" sz="2800" b="1" noProof="0" dirty="0">
+              <a:rPr lang="ro-RO" sz="2400" b="1" noProof="0" dirty="0">
                 <a:solidFill>
                   <a:srgbClr val="7EC699"/>
                 </a:solidFill>
@@ -6775,7 +6775,7 @@
               <a:t>: </a:t>
             </a:r>
             <a:r>
-              <a:rPr lang="ro-RO" sz="2800" b="1" noProof="0" dirty="0">
+              <a:rPr lang="ro-RO" sz="2400" b="1" noProof="0" dirty="0">
                 <a:solidFill>
                   <a:srgbClr val="CCCCCC"/>
                 </a:solidFill>
@@ -6784,7 +6784,7 @@
               <a:t>{</a:t>
             </a:r>
             <a:r>
-              <a:rPr lang="ro-RO" sz="2800" b="1" noProof="0" dirty="0" err="1">
+              <a:rPr lang="ro-RO" sz="2400" b="1" noProof="0" dirty="0" err="1">
                 <a:solidFill>
                   <a:srgbClr val="CCCCCC"/>
                 </a:solidFill>
@@ -6793,7 +6793,7 @@
               <a:t>temperature</a:t>
             </a:r>
             <a:r>
-              <a:rPr lang="ro-RO" sz="2800" b="1" noProof="0" dirty="0">
+              <a:rPr lang="ro-RO" sz="2400" b="1" noProof="0" dirty="0">
                 <a:solidFill>
                   <a:srgbClr val="CCCCCC"/>
                 </a:solidFill>
@@ -6807,7 +6807,7 @@
               <a:buNone/>
             </a:pPr>
             <a:r>
-              <a:rPr lang="ro-RO" sz="2800" b="1" noProof="0" dirty="0">
+              <a:rPr lang="ro-RO" sz="2400" b="1" noProof="0" dirty="0">
                 <a:solidFill>
                   <a:srgbClr val="CCCCCC"/>
                 </a:solidFill>
@@ -6816,7 +6816,7 @@
               <a:t>      </a:t>
             </a:r>
             <a:r>
-              <a:rPr lang="ro-RO" sz="2800" b="1" noProof="0" dirty="0" err="1">
+              <a:rPr lang="ro-RO" sz="2400" b="1" noProof="0" dirty="0" err="1">
                 <a:solidFill>
                   <a:srgbClr val="7EC699"/>
                 </a:solidFill>
@@ -6825,7 +6825,7 @@
               <a:t>degree</a:t>
             </a:r>
             <a:r>
-              <a:rPr lang="ro-RO" sz="2800" b="1" noProof="0" dirty="0">
+              <a:rPr lang="ro-RO" sz="2400" b="1" noProof="0" dirty="0">
                 <a:solidFill>
                   <a:srgbClr val="7EC699"/>
                 </a:solidFill>
@@ -6834,7 +6834,7 @@
               <a:t> C"</a:t>
             </a:r>
             <a:r>
-              <a:rPr lang="ro-RO" sz="2800" b="1" noProof="0" dirty="0">
+              <a:rPr lang="ro-RO" sz="2400" b="1" noProof="0" dirty="0">
                 <a:solidFill>
                   <a:srgbClr val="CCCCCC"/>
                 </a:solidFill>
@@ -6848,7 +6848,7 @@
               <a:buNone/>
             </a:pPr>
             <a:r>
-              <a:rPr lang="ro-RO" sz="2800" b="1" noProof="0" dirty="0">
+              <a:rPr lang="ro-RO" sz="2400" b="1" noProof="0" dirty="0">
                 <a:solidFill>
                   <a:srgbClr val="CCCCCC"/>
                 </a:solidFill>
@@ -6862,7 +6862,7 @@
               <a:buNone/>
             </a:pPr>
             <a:r>
-              <a:rPr lang="ro-RO" sz="2800" b="1" noProof="0" dirty="0">
+              <a:rPr lang="ro-RO" sz="2400" b="1" noProof="0" dirty="0">
                 <a:solidFill>
                   <a:srgbClr val="CCCCCC"/>
                 </a:solidFill>
@@ -6876,7 +6876,7 @@
               <a:buNone/>
             </a:pPr>
             <a:r>
-              <a:rPr lang="ro-RO" sz="2800" b="1" noProof="0" dirty="0">
+              <a:rPr lang="ro-RO" sz="2400" b="1" noProof="0" dirty="0">
                 <a:solidFill>
                   <a:srgbClr val="CCCCCC"/>
                 </a:solidFill>
@@ -6884,7 +6884,7 @@
               </a:rPr>
               <a:t>}</a:t>
             </a:r>
-            <a:endParaRPr lang="ro-RO" sz="2800" noProof="0" dirty="0">
+            <a:endParaRPr lang="ro-RO" sz="2400" noProof="0" dirty="0">
               <a:solidFill>
                 <a:srgbClr val="00B0F0"/>
               </a:solidFill>
@@ -6894,7 +6894,7 @@
             <a:pPr marL="34290" indent="0" algn="just">
               <a:buNone/>
             </a:pPr>
-            <a:endParaRPr lang="ro-RO" sz="2800" noProof="0" dirty="0">
+            <a:endParaRPr lang="ro-RO" sz="2400" noProof="0" dirty="0">
               <a:solidFill>
                 <a:srgbClr val="00B0F0"/>
               </a:solidFill>
@@ -9694,7 +9694,7 @@
               <a:buNone/>
             </a:pPr>
             <a:r>
-              <a:rPr lang="ro-RO" sz="2800" b="1" dirty="0">
+              <a:rPr lang="ro-RO" sz="2400" b="1" dirty="0">
                 <a:solidFill>
                   <a:srgbClr val="CCCCCC"/>
                 </a:solidFill>
@@ -9703,7 +9703,7 @@
               <a:t>       </a:t>
             </a:r>
             <a:r>
-              <a:rPr lang="en-US" sz="2800" b="1" dirty="0">
+              <a:rPr lang="en-US" sz="2400" b="1" dirty="0">
                 <a:solidFill>
                   <a:srgbClr val="CCCCCC"/>
                 </a:solidFill>
@@ -9712,7 +9712,7 @@
               <a:t> </a:t>
             </a:r>
             <a:r>
-              <a:rPr lang="en-US" sz="2800" b="1" dirty="0">
+              <a:rPr lang="en-US" sz="2400" b="1" dirty="0">
                 <a:solidFill>
                   <a:srgbClr val="CC99CD"/>
                 </a:solidFill>
@@ -9721,7 +9721,7 @@
               <a:t>case</a:t>
             </a:r>
             <a:r>
-              <a:rPr lang="en-US" sz="2800" b="1" dirty="0">
+              <a:rPr lang="en-US" sz="2400" b="1" dirty="0">
                 <a:solidFill>
                   <a:srgbClr val="CCCCCC"/>
                 </a:solidFill>
@@ -9730,7 +9730,7 @@
               <a:t> </a:t>
             </a:r>
             <a:r>
-              <a:rPr lang="en-US" sz="2800" b="1" dirty="0">
+              <a:rPr lang="en-US" sz="2400" b="1" dirty="0">
                 <a:solidFill>
                   <a:srgbClr val="7EC699"/>
                 </a:solidFill>
@@ -9739,7 +9739,7 @@
               <a:t>'D’</a:t>
             </a:r>
             <a:r>
-              <a:rPr lang="en-US" sz="2800" b="1" dirty="0">
+              <a:rPr lang="en-US" sz="2400" b="1" dirty="0">
                 <a:solidFill>
                   <a:srgbClr val="CCCCCC"/>
                 </a:solidFill>
@@ -9747,7 +9747,7 @@
               </a:rPr>
               <a:t>:</a:t>
             </a:r>
-            <a:endParaRPr lang="ro-RO" sz="2800" b="1" dirty="0">
+            <a:endParaRPr lang="ro-RO" sz="2400" b="1" dirty="0">
               <a:solidFill>
                 <a:srgbClr val="CCCCCC"/>
               </a:solidFill>
@@ -9759,7 +9759,7 @@
               <a:buNone/>
             </a:pPr>
             <a:r>
-              <a:rPr lang="ro-RO" sz="2800" b="1" dirty="0">
+              <a:rPr lang="ro-RO" sz="2400" b="1" dirty="0">
                 <a:solidFill>
                   <a:srgbClr val="CCCCCC"/>
                 </a:solidFill>
@@ -9768,7 +9768,7 @@
               <a:t>          </a:t>
             </a:r>
             <a:r>
-              <a:rPr lang="en-US" sz="2800" b="1" dirty="0" err="1">
+              <a:rPr lang="en-US" sz="2400" b="1" dirty="0" err="1">
                 <a:solidFill>
                   <a:srgbClr val="CCCCCC"/>
                 </a:solidFill>
@@ -9777,7 +9777,7 @@
               <a:t>Console.</a:t>
             </a:r>
             <a:r>
-              <a:rPr lang="en-US" sz="2800" b="1" dirty="0" err="1">
+              <a:rPr lang="en-US" sz="2400" b="1" dirty="0" err="1">
                 <a:solidFill>
                   <a:srgbClr val="F08D49"/>
                 </a:solidFill>
@@ -9786,7 +9786,7 @@
               <a:t>WriteLine</a:t>
             </a:r>
             <a:r>
-              <a:rPr lang="en-US" sz="2800" b="1" dirty="0">
+              <a:rPr lang="en-US" sz="2400" b="1" dirty="0">
                 <a:solidFill>
                   <a:srgbClr val="CCCCCC"/>
                 </a:solidFill>
@@ -9795,7 +9795,7 @@
               <a:t>(</a:t>
             </a:r>
             <a:r>
-              <a:rPr lang="en-US" sz="2800" b="1" dirty="0">
+              <a:rPr lang="en-US" sz="2400" b="1" dirty="0">
                 <a:solidFill>
                   <a:srgbClr val="7EC699"/>
                 </a:solidFill>
@@ -9803,7 +9803,7 @@
               </a:rPr>
               <a:t>"You</a:t>
             </a:r>
-            <a:endParaRPr lang="ro-RO" sz="2800" b="1" dirty="0">
+            <a:endParaRPr lang="ro-RO" sz="2400" b="1" dirty="0">
               <a:solidFill>
                 <a:srgbClr val="7EC699"/>
               </a:solidFill>
@@ -9815,7 +9815,7 @@
               <a:buNone/>
             </a:pPr>
             <a:r>
-              <a:rPr lang="ro-RO" sz="2800" b="1" dirty="0">
+              <a:rPr lang="ro-RO" sz="2400" b="1" dirty="0">
                 <a:solidFill>
                   <a:srgbClr val="7EC699"/>
                 </a:solidFill>
@@ -9824,7 +9824,7 @@
               <a:t>         </a:t>
             </a:r>
             <a:r>
-              <a:rPr lang="en-US" sz="2800" b="1" dirty="0">
+              <a:rPr lang="en-US" sz="2400" b="1" dirty="0">
                 <a:solidFill>
                   <a:srgbClr val="7EC699"/>
                 </a:solidFill>
@@ -9833,7 +9833,7 @@
               <a:t> passed"</a:t>
             </a:r>
             <a:r>
-              <a:rPr lang="en-US" sz="2800" b="1" dirty="0">
+              <a:rPr lang="en-US" sz="2400" b="1" dirty="0">
                 <a:solidFill>
                   <a:srgbClr val="CCCCCC"/>
                 </a:solidFill>
@@ -9841,7 +9841,7 @@
               </a:rPr>
               <a:t>); </a:t>
             </a:r>
-            <a:endParaRPr lang="ro-RO" sz="2800" b="1" dirty="0">
+            <a:endParaRPr lang="ro-RO" sz="2400" b="1" dirty="0">
               <a:solidFill>
                 <a:srgbClr val="CCCCCC"/>
               </a:solidFill>
@@ -9853,7 +9853,7 @@
               <a:buNone/>
             </a:pPr>
             <a:r>
-              <a:rPr lang="ro-RO" sz="2800" b="1" dirty="0">
+              <a:rPr lang="ro-RO" sz="2400" b="1" dirty="0">
                 <a:solidFill>
                   <a:srgbClr val="CCCCCC"/>
                 </a:solidFill>
@@ -9862,7 +9862,7 @@
               <a:t>          </a:t>
             </a:r>
             <a:r>
-              <a:rPr lang="en-US" sz="2800" b="1" dirty="0">
+              <a:rPr lang="en-US" sz="2400" b="1" dirty="0">
                 <a:solidFill>
                   <a:srgbClr val="CC99CD"/>
                 </a:solidFill>
@@ -9871,7 +9871,7 @@
               <a:t>break</a:t>
             </a:r>
             <a:r>
-              <a:rPr lang="en-US" sz="2800" b="1" dirty="0">
+              <a:rPr lang="en-US" sz="2400" b="1" dirty="0">
                 <a:solidFill>
                   <a:srgbClr val="CCCCCC"/>
                 </a:solidFill>
@@ -9879,7 +9879,7 @@
               </a:rPr>
               <a:t>; </a:t>
             </a:r>
-            <a:endParaRPr lang="ro-RO" sz="2800" b="1" dirty="0">
+            <a:endParaRPr lang="ro-RO" sz="2400" b="1" dirty="0">
               <a:solidFill>
                 <a:srgbClr val="CCCCCC"/>
               </a:solidFill>
@@ -9891,7 +9891,7 @@
               <a:buNone/>
             </a:pPr>
             <a:r>
-              <a:rPr lang="ro-RO" sz="2800" b="1" dirty="0">
+              <a:rPr lang="ro-RO" sz="2400" b="1" dirty="0">
                 <a:solidFill>
                   <a:srgbClr val="CCCCCC"/>
                 </a:solidFill>
@@ -9900,7 +9900,7 @@
               <a:t>        </a:t>
             </a:r>
             <a:r>
-              <a:rPr lang="en-US" sz="2800" b="1" dirty="0">
+              <a:rPr lang="en-US" sz="2400" b="1" dirty="0">
                 <a:solidFill>
                   <a:srgbClr val="CC99CD"/>
                 </a:solidFill>
@@ -9909,7 +9909,7 @@
               <a:t>case</a:t>
             </a:r>
             <a:r>
-              <a:rPr lang="en-US" sz="2800" b="1" dirty="0">
+              <a:rPr lang="en-US" sz="2400" b="1" dirty="0">
                 <a:solidFill>
                   <a:srgbClr val="CCCCCC"/>
                 </a:solidFill>
@@ -9918,7 +9918,7 @@
               <a:t> </a:t>
             </a:r>
             <a:r>
-              <a:rPr lang="en-US" sz="2800" b="1" dirty="0">
+              <a:rPr lang="en-US" sz="2400" b="1" dirty="0">
                 <a:solidFill>
                   <a:srgbClr val="7EC699"/>
                 </a:solidFill>
@@ -9927,7 +9927,7 @@
               <a:t>'F’</a:t>
             </a:r>
             <a:r>
-              <a:rPr lang="en-US" sz="2800" b="1" dirty="0">
+              <a:rPr lang="en-US" sz="2400" b="1" dirty="0">
                 <a:solidFill>
                   <a:srgbClr val="CCCCCC"/>
                 </a:solidFill>
@@ -9935,7 +9935,7 @@
               </a:rPr>
               <a:t>:</a:t>
             </a:r>
-            <a:endParaRPr lang="ro-RO" sz="2800" b="1" dirty="0">
+            <a:endParaRPr lang="ro-RO" sz="2400" b="1" dirty="0">
               <a:solidFill>
                 <a:srgbClr val="CCCCCC"/>
               </a:solidFill>
@@ -9947,7 +9947,7 @@
               <a:buNone/>
             </a:pPr>
             <a:r>
-              <a:rPr lang="ro-RO" sz="2800" b="1" dirty="0">
+              <a:rPr lang="ro-RO" sz="2400" b="1" dirty="0">
                 <a:solidFill>
                   <a:srgbClr val="CCCCCC"/>
                 </a:solidFill>
@@ -9956,7 +9956,7 @@
               <a:t>         </a:t>
             </a:r>
             <a:r>
-              <a:rPr lang="en-US" sz="2800" b="1" dirty="0">
+              <a:rPr lang="en-US" sz="2400" b="1" dirty="0">
                 <a:solidFill>
                   <a:srgbClr val="CCCCCC"/>
                 </a:solidFill>
@@ -9965,7 +9965,7 @@
               <a:t> </a:t>
             </a:r>
             <a:r>
-              <a:rPr lang="en-US" sz="2800" b="1" dirty="0" err="1">
+              <a:rPr lang="en-US" sz="2400" b="1" dirty="0" err="1">
                 <a:solidFill>
                   <a:srgbClr val="CCCCCC"/>
                 </a:solidFill>
@@ -9974,7 +9974,7 @@
               <a:t>Console.</a:t>
             </a:r>
             <a:r>
-              <a:rPr lang="en-US" sz="2800" b="1" dirty="0" err="1">
+              <a:rPr lang="en-US" sz="2400" b="1" dirty="0" err="1">
                 <a:solidFill>
                   <a:srgbClr val="F08D49"/>
                 </a:solidFill>
@@ -9983,7 +9983,7 @@
               <a:t>WriteLine</a:t>
             </a:r>
             <a:r>
-              <a:rPr lang="en-US" sz="2800" b="1" dirty="0">
+              <a:rPr lang="en-US" sz="2400" b="1" dirty="0">
                 <a:solidFill>
                   <a:srgbClr val="CCCCCC"/>
                 </a:solidFill>
@@ -9992,7 +9992,7 @@
               <a:t>(</a:t>
             </a:r>
             <a:r>
-              <a:rPr lang="en-US" sz="2800" b="1" dirty="0">
+              <a:rPr lang="en-US" sz="2400" b="1" dirty="0">
                 <a:solidFill>
                   <a:srgbClr val="7EC699"/>
                 </a:solidFill>
@@ -10000,7 +10000,7 @@
               </a:rPr>
               <a:t>"Better</a:t>
             </a:r>
-            <a:endParaRPr lang="ro-RO" sz="2800" b="1" dirty="0">
+            <a:endParaRPr lang="ro-RO" sz="2400" b="1" dirty="0">
               <a:solidFill>
                 <a:srgbClr val="7EC699"/>
               </a:solidFill>
@@ -10012,7 +10012,7 @@
               <a:buNone/>
             </a:pPr>
             <a:r>
-              <a:rPr lang="ro-RO" sz="2800" b="1" dirty="0">
+              <a:rPr lang="ro-RO" sz="2400" b="1" dirty="0">
                 <a:solidFill>
                   <a:srgbClr val="7EC699"/>
                 </a:solidFill>
@@ -10021,7 +10021,7 @@
               <a:t>         </a:t>
             </a:r>
             <a:r>
-              <a:rPr lang="en-US" sz="2800" b="1" dirty="0">
+              <a:rPr lang="en-US" sz="2400" b="1" dirty="0">
                 <a:solidFill>
                   <a:srgbClr val="7EC699"/>
                 </a:solidFill>
@@ -10030,7 +10030,7 @@
               <a:t> try again"</a:t>
             </a:r>
             <a:r>
-              <a:rPr lang="en-US" sz="2800" b="1" dirty="0">
+              <a:rPr lang="en-US" sz="2400" b="1" dirty="0">
                 <a:solidFill>
                   <a:srgbClr val="CCCCCC"/>
                 </a:solidFill>
@@ -10038,7 +10038,7 @@
               </a:rPr>
               <a:t>); </a:t>
             </a:r>
-            <a:endParaRPr lang="ro-RO" sz="2800" b="1" dirty="0">
+            <a:endParaRPr lang="ro-RO" sz="2400" b="1" dirty="0">
               <a:solidFill>
                 <a:srgbClr val="CCCCCC"/>
               </a:solidFill>
@@ -10050,7 +10050,7 @@
               <a:buNone/>
             </a:pPr>
             <a:r>
-              <a:rPr lang="ro-RO" sz="2800" b="1" dirty="0">
+              <a:rPr lang="ro-RO" sz="2400" b="1" dirty="0">
                 <a:solidFill>
                   <a:srgbClr val="CCCCCC"/>
                 </a:solidFill>
@@ -10059,7 +10059,7 @@
               <a:t>          </a:t>
             </a:r>
             <a:r>
-              <a:rPr lang="en-US" sz="2800" b="1" dirty="0">
+              <a:rPr lang="en-US" sz="2400" b="1" dirty="0">
                 <a:solidFill>
                   <a:srgbClr val="CC99CD"/>
                 </a:solidFill>
@@ -10068,7 +10068,7 @@
               <a:t>break</a:t>
             </a:r>
             <a:r>
-              <a:rPr lang="en-US" sz="2800" b="1" dirty="0">
+              <a:rPr lang="en-US" sz="2400" b="1" dirty="0">
                 <a:solidFill>
                   <a:srgbClr val="CCCCCC"/>
                 </a:solidFill>
@@ -10076,7 +10076,7 @@
               </a:rPr>
               <a:t>;</a:t>
             </a:r>
-            <a:endParaRPr lang="ro-RO" sz="2800" b="1" dirty="0">
+            <a:endParaRPr lang="ro-RO" sz="2400" b="1" dirty="0">
               <a:solidFill>
                 <a:srgbClr val="CCCCCC"/>
               </a:solidFill>
@@ -10088,7 +10088,7 @@
               <a:buNone/>
             </a:pPr>
             <a:r>
-              <a:rPr lang="ro-RO" sz="2800" b="1" dirty="0">
+              <a:rPr lang="ro-RO" sz="2400" b="1" dirty="0">
                 <a:solidFill>
                   <a:srgbClr val="CCCCCC"/>
                 </a:solidFill>
@@ -10097,7 +10097,7 @@
               <a:t>       </a:t>
             </a:r>
             <a:r>
-              <a:rPr lang="en-US" sz="2800" b="1" dirty="0">
+              <a:rPr lang="en-US" sz="2400" b="1" dirty="0">
                 <a:solidFill>
                   <a:srgbClr val="CCCCCC"/>
                 </a:solidFill>
@@ -10105,7 +10105,7 @@
               </a:rPr>
               <a:t> </a:t>
             </a:r>
-            <a:endParaRPr lang="ro-RO" sz="2800" noProof="0" dirty="0">
+            <a:endParaRPr lang="ro-RO" sz="2400" noProof="0" dirty="0">
               <a:solidFill>
                 <a:srgbClr val="00B0F0"/>
               </a:solidFill>
@@ -10216,7 +10216,7 @@
               <a:buNone/>
             </a:pPr>
             <a:r>
-              <a:rPr lang="ro-RO" sz="2800" b="1" dirty="0">
+              <a:rPr lang="ro-RO" sz="2400" b="1" dirty="0">
                 <a:solidFill>
                   <a:srgbClr val="CC99CD"/>
                 </a:solidFill>
@@ -10225,7 +10225,7 @@
               <a:t>        </a:t>
             </a:r>
             <a:r>
-              <a:rPr lang="en-US" sz="2800" b="1" dirty="0">
+              <a:rPr lang="en-US" sz="2400" b="1" dirty="0">
                 <a:solidFill>
                   <a:srgbClr val="CC99CD"/>
                 </a:solidFill>
@@ -10234,7 +10234,7 @@
               <a:t>default</a:t>
             </a:r>
             <a:r>
-              <a:rPr lang="en-US" sz="2800" b="1" dirty="0">
+              <a:rPr lang="en-US" sz="2400" b="1" dirty="0">
                 <a:solidFill>
                   <a:srgbClr val="CCCCCC"/>
                 </a:solidFill>
@@ -10243,7 +10243,7 @@
               <a:t>: </a:t>
             </a:r>
             <a:r>
-              <a:rPr lang="ro-RO" sz="2800" b="1" dirty="0">
+              <a:rPr lang="ro-RO" sz="2400" b="1" dirty="0">
                 <a:solidFill>
                   <a:srgbClr val="CCCCCC"/>
                 </a:solidFill>
@@ -10257,7 +10257,7 @@
               <a:buNone/>
             </a:pPr>
             <a:r>
-              <a:rPr lang="ro-RO" sz="2800" b="1" dirty="0">
+              <a:rPr lang="ro-RO" sz="2400" b="1" dirty="0">
                 <a:solidFill>
                   <a:srgbClr val="CCCCCC"/>
                 </a:solidFill>
@@ -10266,7 +10266,7 @@
               <a:t>          </a:t>
             </a:r>
             <a:r>
-              <a:rPr lang="en-US" sz="2800" b="1" dirty="0" err="1">
+              <a:rPr lang="en-US" sz="2400" b="1" dirty="0" err="1">
                 <a:solidFill>
                   <a:srgbClr val="CCCCCC"/>
                 </a:solidFill>
@@ -10275,7 +10275,7 @@
               <a:t>Console.</a:t>
             </a:r>
             <a:r>
-              <a:rPr lang="en-US" sz="2800" b="1" dirty="0" err="1">
+              <a:rPr lang="en-US" sz="2400" b="1" dirty="0" err="1">
                 <a:solidFill>
                   <a:srgbClr val="F08D49"/>
                 </a:solidFill>
@@ -10284,7 +10284,7 @@
               <a:t>WriteLine</a:t>
             </a:r>
             <a:r>
-              <a:rPr lang="en-US" sz="2800" b="1" dirty="0">
+              <a:rPr lang="en-US" sz="2400" b="1" dirty="0">
                 <a:solidFill>
                   <a:srgbClr val="CCCCCC"/>
                 </a:solidFill>
@@ -10293,7 +10293,7 @@
               <a:t>(</a:t>
             </a:r>
             <a:r>
-              <a:rPr lang="en-US" sz="2800" b="1" dirty="0">
+              <a:rPr lang="en-US" sz="2400" b="1" dirty="0">
                 <a:solidFill>
                   <a:srgbClr val="7EC699"/>
                 </a:solidFill>
@@ -10301,7 +10301,7 @@
               </a:rPr>
               <a:t>"Invalid</a:t>
             </a:r>
-            <a:endParaRPr lang="ro-RO" sz="2800" b="1" dirty="0">
+            <a:endParaRPr lang="ro-RO" sz="2400" b="1" dirty="0">
               <a:solidFill>
                 <a:srgbClr val="7EC699"/>
               </a:solidFill>
@@ -10313,7 +10313,7 @@
               <a:buNone/>
             </a:pPr>
             <a:r>
-              <a:rPr lang="ro-RO" sz="2800" b="1" dirty="0">
+              <a:rPr lang="ro-RO" sz="2400" b="1" dirty="0">
                 <a:solidFill>
                   <a:srgbClr val="7EC699"/>
                 </a:solidFill>
@@ -10322,7 +10322,7 @@
               <a:t>         </a:t>
             </a:r>
             <a:r>
-              <a:rPr lang="en-US" sz="2800" b="1" dirty="0">
+              <a:rPr lang="en-US" sz="2400" b="1" dirty="0">
                 <a:solidFill>
                   <a:srgbClr val="7EC699"/>
                 </a:solidFill>
@@ -10331,7 +10331,7 @@
               <a:t> grade"</a:t>
             </a:r>
             <a:r>
-              <a:rPr lang="en-US" sz="2800" b="1" dirty="0">
+              <a:rPr lang="en-US" sz="2400" b="1" dirty="0">
                 <a:solidFill>
                   <a:srgbClr val="CCCCCC"/>
                 </a:solidFill>
@@ -10339,7 +10339,7 @@
               </a:rPr>
               <a:t>); </a:t>
             </a:r>
-            <a:endParaRPr lang="ro-RO" sz="2800" b="1" dirty="0">
+            <a:endParaRPr lang="ro-RO" sz="2400" b="1" dirty="0">
               <a:solidFill>
                 <a:srgbClr val="CCCCCC"/>
               </a:solidFill>
@@ -10351,7 +10351,7 @@
               <a:buNone/>
             </a:pPr>
             <a:r>
-              <a:rPr lang="ro-RO" sz="2800" b="1" dirty="0">
+              <a:rPr lang="ro-RO" sz="2400" b="1" dirty="0">
                 <a:solidFill>
                   <a:srgbClr val="CCCCCC"/>
                 </a:solidFill>
@@ -10360,7 +10360,7 @@
               <a:t>          </a:t>
             </a:r>
             <a:r>
-              <a:rPr lang="en-US" sz="2800" b="1" dirty="0">
+              <a:rPr lang="en-US" sz="2400" b="1" dirty="0">
                 <a:solidFill>
                   <a:srgbClr val="CC99CD"/>
                 </a:solidFill>
@@ -10369,7 +10369,7 @@
               <a:t>break</a:t>
             </a:r>
             <a:r>
-              <a:rPr lang="en-US" sz="2800" b="1" dirty="0">
+              <a:rPr lang="en-US" sz="2400" b="1" dirty="0">
                 <a:solidFill>
                   <a:srgbClr val="CCCCCC"/>
                 </a:solidFill>
@@ -10377,7 +10377,7 @@
               </a:rPr>
               <a:t>;</a:t>
             </a:r>
-            <a:endParaRPr lang="ro-RO" sz="2800" b="1" dirty="0">
+            <a:endParaRPr lang="ro-RO" sz="2400" b="1" dirty="0">
               <a:solidFill>
                 <a:srgbClr val="CCCCCC"/>
               </a:solidFill>
@@ -10389,7 +10389,7 @@
               <a:buNone/>
             </a:pPr>
             <a:r>
-              <a:rPr lang="ro-RO" sz="2800" b="1" dirty="0">
+              <a:rPr lang="ro-RO" sz="2400" b="1" dirty="0">
                 <a:solidFill>
                   <a:srgbClr val="CCCCCC"/>
                 </a:solidFill>
@@ -10398,7 +10398,7 @@
               <a:t>      </a:t>
             </a:r>
             <a:r>
-              <a:rPr lang="en-US" sz="2800" b="1" dirty="0">
+              <a:rPr lang="en-US" sz="2400" b="1" dirty="0">
                 <a:solidFill>
                   <a:srgbClr val="CCCCCC"/>
                 </a:solidFill>
@@ -10406,7 +10406,7 @@
               </a:rPr>
               <a:t>} </a:t>
             </a:r>
-            <a:endParaRPr lang="ro-RO" sz="2800" b="1" dirty="0">
+            <a:endParaRPr lang="ro-RO" sz="2400" b="1" dirty="0">
               <a:solidFill>
                 <a:srgbClr val="CCCCCC"/>
               </a:solidFill>
@@ -10418,7 +10418,7 @@
               <a:buNone/>
             </a:pPr>
             <a:r>
-              <a:rPr lang="ro-RO" sz="2800" b="1" dirty="0">
+              <a:rPr lang="ro-RO" sz="2400" b="1" dirty="0">
                 <a:solidFill>
                   <a:srgbClr val="CCCCCC"/>
                 </a:solidFill>
@@ -10427,7 +10427,7 @@
               <a:t>      </a:t>
             </a:r>
             <a:r>
-              <a:rPr lang="en-US" sz="2800" b="1" dirty="0" err="1">
+              <a:rPr lang="en-US" sz="2400" b="1" dirty="0" err="1">
                 <a:solidFill>
                   <a:srgbClr val="CCCCCC"/>
                 </a:solidFill>
@@ -10436,7 +10436,7 @@
               <a:t>Console.</a:t>
             </a:r>
             <a:r>
-              <a:rPr lang="en-US" sz="2800" b="1" dirty="0" err="1">
+              <a:rPr lang="en-US" sz="2400" b="1" dirty="0" err="1">
                 <a:solidFill>
                   <a:srgbClr val="F08D49"/>
                 </a:solidFill>
@@ -10445,7 +10445,7 @@
               <a:t>WriteLine</a:t>
             </a:r>
             <a:r>
-              <a:rPr lang="en-US" sz="2800" b="1" dirty="0">
+              <a:rPr lang="en-US" sz="2400" b="1" dirty="0">
                 <a:solidFill>
                   <a:srgbClr val="CCCCCC"/>
                 </a:solidFill>
@@ -10454,7 +10454,7 @@
               <a:t>(</a:t>
             </a:r>
             <a:r>
-              <a:rPr lang="en-US" sz="2800" b="1" dirty="0">
+              <a:rPr lang="en-US" sz="2400" b="1" dirty="0">
                 <a:solidFill>
                   <a:srgbClr val="7EC699"/>
                 </a:solidFill>
@@ -10462,7 +10462,7 @@
               </a:rPr>
               <a:t>"Your grade </a:t>
             </a:r>
-            <a:endParaRPr lang="ro-RO" sz="2800" b="1" dirty="0">
+            <a:endParaRPr lang="ro-RO" sz="2400" b="1" dirty="0">
               <a:solidFill>
                 <a:srgbClr val="7EC699"/>
               </a:solidFill>
@@ -10474,7 +10474,7 @@
               <a:buNone/>
             </a:pPr>
             <a:r>
-              <a:rPr lang="ro-RO" sz="2800" b="1" dirty="0">
+              <a:rPr lang="ro-RO" sz="2400" b="1" dirty="0">
                 <a:solidFill>
                   <a:srgbClr val="7EC699"/>
                 </a:solidFill>
@@ -10483,7 +10483,7 @@
               <a:t>      </a:t>
             </a:r>
             <a:r>
-              <a:rPr lang="en-US" sz="2800" b="1" dirty="0">
+              <a:rPr lang="en-US" sz="2400" b="1" dirty="0">
                 <a:solidFill>
                   <a:srgbClr val="7EC699"/>
                 </a:solidFill>
@@ -10492,7 +10492,7 @@
               <a:t>is {0}"</a:t>
             </a:r>
             <a:r>
-              <a:rPr lang="en-US" sz="2800" b="1" dirty="0">
+              <a:rPr lang="en-US" sz="2400" b="1" dirty="0">
                 <a:solidFill>
                   <a:srgbClr val="CCCCCC"/>
                 </a:solidFill>
@@ -10500,7 +10500,7 @@
               </a:rPr>
               <a:t>, grade);</a:t>
             </a:r>
-            <a:endParaRPr lang="ro-RO" sz="2800" b="1" dirty="0">
+            <a:endParaRPr lang="ro-RO" sz="2400" b="1" dirty="0">
               <a:solidFill>
                 <a:srgbClr val="CCCCCC"/>
               </a:solidFill>
@@ -10512,7 +10512,7 @@
               <a:buNone/>
             </a:pPr>
             <a:r>
-              <a:rPr lang="ro-RO" sz="2800" b="1" dirty="0">
+              <a:rPr lang="ro-RO" sz="2400" b="1" dirty="0">
                 <a:solidFill>
                   <a:srgbClr val="CCCCCC"/>
                 </a:solidFill>
@@ -10521,7 +10521,7 @@
               <a:t>    </a:t>
             </a:r>
             <a:r>
-              <a:rPr lang="en-US" sz="2800" b="1" dirty="0">
+              <a:rPr lang="en-US" sz="2400" b="1" dirty="0">
                 <a:solidFill>
                   <a:srgbClr val="CCCCCC"/>
                 </a:solidFill>
@@ -10529,7 +10529,7 @@
               </a:rPr>
               <a:t>} </a:t>
             </a:r>
-            <a:endParaRPr lang="ro-RO" sz="2800" b="1" dirty="0">
+            <a:endParaRPr lang="ro-RO" sz="2400" b="1" dirty="0">
               <a:solidFill>
                 <a:srgbClr val="CCCCCC"/>
               </a:solidFill>
@@ -10541,7 +10541,7 @@
               <a:buNone/>
             </a:pPr>
             <a:r>
-              <a:rPr lang="ro-RO" sz="2800" b="1" dirty="0">
+              <a:rPr lang="ro-RO" sz="2400" b="1" dirty="0">
                 <a:solidFill>
                   <a:srgbClr val="CCCCCC"/>
                 </a:solidFill>
@@ -10550,7 +10550,7 @@
               <a:t>  </a:t>
             </a:r>
             <a:r>
-              <a:rPr lang="en-US" sz="2800" b="1" dirty="0">
+              <a:rPr lang="en-US" sz="2400" b="1" dirty="0">
                 <a:solidFill>
                   <a:srgbClr val="CCCCCC"/>
                 </a:solidFill>
@@ -10558,7 +10558,7 @@
               </a:rPr>
               <a:t>} </a:t>
             </a:r>
-            <a:endParaRPr lang="ro-RO" sz="2800" b="1" dirty="0">
+            <a:endParaRPr lang="ro-RO" sz="2400" b="1" dirty="0">
               <a:solidFill>
                 <a:srgbClr val="CCCCCC"/>
               </a:solidFill>
@@ -10570,7 +10570,7 @@
               <a:buNone/>
             </a:pPr>
             <a:r>
-              <a:rPr lang="en-US" sz="2800" b="1" dirty="0">
+              <a:rPr lang="en-US" sz="2400" b="1" dirty="0">
                 <a:solidFill>
                   <a:srgbClr val="CCCCCC"/>
                 </a:solidFill>
@@ -10578,7 +10578,7 @@
               </a:rPr>
               <a:t>}</a:t>
             </a:r>
-            <a:endParaRPr lang="ro-RO" sz="2800" b="1" dirty="0">
+            <a:endParaRPr lang="ro-RO" sz="2400" b="1" dirty="0">
               <a:solidFill>
                 <a:srgbClr val="00B0F0"/>
               </a:solidFill>
@@ -10588,7 +10588,7 @@
             <a:pPr marL="34290" indent="0" algn="just">
               <a:buNone/>
             </a:pPr>
-            <a:endParaRPr lang="ro-RO" sz="2800" noProof="0" dirty="0">
+            <a:endParaRPr lang="ro-RO" sz="2400" noProof="0" dirty="0">
               <a:solidFill>
                 <a:srgbClr val="00B0F0"/>
               </a:solidFill>

</xml_diff>